<commit_message>
Update The Structure of IO Tables.pptx
update ppp
</commit_message>
<xml_diff>
--- a/Module 1/1.2 The Structure of IO Tables/The Structure of IO Tables.pptx
+++ b/Module 1/1.2 The Structure of IO Tables/The Structure of IO Tables.pptx
@@ -175,51 +175,6 @@
     </p:extLst>
   </p:cmAuthor>
 </p:cmAuthorLst>
-</file>
-
-<file path=ppt/comments/comment1.xml><?xml version="1.0" encoding="utf-8"?>
-<p:cmLst xmlns:a="http://schemas.openxmlformats.org/drawingml/2006/main" xmlns:r="http://schemas.openxmlformats.org/officeDocument/2006/relationships" xmlns:p="http://schemas.openxmlformats.org/presentationml/2006/main">
-  <p:cm authorId="2" dt="2025-04-22T14:53:28.040" idx="1">
-    <p:pos x="6555" y="1646"/>
-    <p:text>The thing is C, G, I, and X in IO final demand is already substracted from imports</p:text>
-    <p:extLst>
-      <p:ext uri="{C676402C-5697-4E1C-873F-D02D1690AC5C}">
-        <p15:threadingInfo xmlns:p15="http://schemas.microsoft.com/office/powerpoint/2012/main" timeZoneBias="-120"/>
-      </p:ext>
-    </p:extLst>
-  </p:cm>
-  <p:cm authorId="3" dt="2025-04-23T11:49:30.824" idx="2">
-    <p:pos x="6555" y="1782"/>
-    <p:text>I changed the sentences</p:text>
-    <p:extLst>
-      <p:ext uri="{C676402C-5697-4E1C-873F-D02D1690AC5C}">
-        <p15:threadingInfo xmlns:p15="http://schemas.microsoft.com/office/powerpoint/2012/main" timeZoneBias="-120">
-          <p15:parentCm authorId="2" idx="1"/>
-        </p15:threadingInfo>
-      </p:ext>
-    </p:extLst>
-  </p:cm>
-  <p:cm authorId="2" dt="2025-04-22T14:55:10.724" idx="2">
-    <p:pos x="6369" y="3407"/>
-    <p:text>The f/y vector does not include imports - I can't reduce the retangule on final demand</p:text>
-    <p:extLst>
-      <p:ext uri="{C676402C-5697-4E1C-873F-D02D1690AC5C}">
-        <p15:threadingInfo xmlns:p15="http://schemas.microsoft.com/office/powerpoint/2012/main" timeZoneBias="-120"/>
-      </p:ext>
-    </p:extLst>
-  </p:cm>
-  <p:cm authorId="3" dt="2025-04-23T11:46:05.902" idx="1">
-    <p:pos x="6369" y="3543"/>
-    <p:text>Corrected.</p:text>
-    <p:extLst>
-      <p:ext uri="{C676402C-5697-4E1C-873F-D02D1690AC5C}">
-        <p15:threadingInfo xmlns:p15="http://schemas.microsoft.com/office/powerpoint/2012/main" timeZoneBias="-120">
-          <p15:parentCm authorId="2" idx="2"/>
-        </p15:threadingInfo>
-      </p:ext>
-    </p:extLst>
-  </p:cm>
-</p:cmLst>
 </file>
 
 <file path=ppt/handoutMasters/handoutMaster1.xml><?xml version="1.0" encoding="utf-8"?>

</xml_diff>